<commit_message>
Update model component diagram
</commit_message>
<xml_diff>
--- a/docs/diagrams/ModelComponentClassDiagram.pptx
+++ b/docs/diagrams/ModelComponentClassDiagram.pptx
@@ -126,6 +126,10 @@
 </p:presentation>
 </file>
 
+<file path=ppt/revisionInfo.xml><?xml version="1.0" encoding="utf-8"?>
+<p1510:revInfo xmlns:a="http://schemas.openxmlformats.org/drawingml/2006/main" xmlns:r="http://schemas.openxmlformats.org/officeDocument/2006/relationships" xmlns:p1510="http://schemas.microsoft.com/office/powerpoint/2015/10/main"/>
+</file>
+
 <file path=ppt/notesMasters/notesMaster1.xml><?xml version="1.0" encoding="utf-8"?>
 <p:notesMaster xmlns:a="http://schemas.openxmlformats.org/drawingml/2006/main" xmlns:r="http://schemas.openxmlformats.org/officeDocument/2006/relationships" xmlns:p="http://schemas.openxmlformats.org/presentationml/2006/main">
   <p:cSld>
@@ -208,7 +212,7 @@
           <a:p>
             <a:fld id="{F5CC4B3F-88C1-4FFA-B1B6-F41C21DC6924}" type="datetimeFigureOut">
               <a:rPr lang="en-US" smtClean="0"/>
-              <a:t>9/4/17</a:t>
+              <a:t>11/13/2017</a:t>
             </a:fld>
             <a:endParaRPr lang="en-US"/>
           </a:p>
@@ -272,38 +276,37 @@
           <a:p>
             <a:pPr lvl="0"/>
             <a:r>
-              <a:rPr lang="en-US" smtClean="0"/>
+              <a:rPr lang="en-US"/>
               <a:t>Click to edit Master text styles</a:t>
             </a:r>
           </a:p>
           <a:p>
             <a:pPr lvl="1"/>
             <a:r>
-              <a:rPr lang="en-US" smtClean="0"/>
+              <a:rPr lang="en-US"/>
               <a:t>Second level</a:t>
             </a:r>
           </a:p>
           <a:p>
             <a:pPr lvl="2"/>
             <a:r>
-              <a:rPr lang="en-US" smtClean="0"/>
+              <a:rPr lang="en-US"/>
               <a:t>Third level</a:t>
             </a:r>
           </a:p>
           <a:p>
             <a:pPr lvl="3"/>
             <a:r>
-              <a:rPr lang="en-US" smtClean="0"/>
+              <a:rPr lang="en-US"/>
               <a:t>Fourth level</a:t>
             </a:r>
           </a:p>
           <a:p>
             <a:pPr lvl="4"/>
             <a:r>
-              <a:rPr lang="en-US" smtClean="0"/>
+              <a:rPr lang="en-US"/>
               <a:t>Fifth level</a:t>
             </a:r>
-            <a:endParaRPr lang="en-US"/>
           </a:p>
         </p:txBody>
       </p:sp>
@@ -514,10 +517,9 @@
           <a:lstStyle/>
           <a:p>
             <a:r>
-              <a:rPr lang="en-US" smtClean="0"/>
+              <a:rPr lang="en-US"/>
               <a:t>Click to edit Master title style</a:t>
             </a:r>
-            <a:endParaRPr lang="en-US"/>
           </a:p>
         </p:txBody>
       </p:sp>
@@ -633,10 +635,9 @@
           </a:lstStyle>
           <a:p>
             <a:r>
-              <a:rPr lang="en-US" smtClean="0"/>
+              <a:rPr lang="en-US"/>
               <a:t>Click to edit Master subtitle style</a:t>
             </a:r>
-            <a:endParaRPr lang="en-US"/>
           </a:p>
         </p:txBody>
       </p:sp>
@@ -657,7 +658,7 @@
           <a:p>
             <a:fld id="{78C97017-6FC3-485B-9764-EAC9E56C1D49}" type="datetimeFigureOut">
               <a:rPr lang="en-US" smtClean="0"/>
-              <a:t>9/4/17</a:t>
+              <a:t>11/13/2017</a:t>
             </a:fld>
             <a:endParaRPr lang="en-US"/>
           </a:p>
@@ -751,10 +752,9 @@
           <a:lstStyle/>
           <a:p>
             <a:r>
-              <a:rPr lang="en-US" smtClean="0"/>
+              <a:rPr lang="en-US"/>
               <a:t>Click to edit Master title style</a:t>
             </a:r>
-            <a:endParaRPr lang="en-US"/>
           </a:p>
         </p:txBody>
       </p:sp>
@@ -775,38 +775,37 @@
           <a:p>
             <a:pPr lvl="0"/>
             <a:r>
-              <a:rPr lang="en-US" smtClean="0"/>
+              <a:rPr lang="en-US"/>
               <a:t>Click to edit Master text styles</a:t>
             </a:r>
           </a:p>
           <a:p>
             <a:pPr lvl="1"/>
             <a:r>
-              <a:rPr lang="en-US" smtClean="0"/>
+              <a:rPr lang="en-US"/>
               <a:t>Second level</a:t>
             </a:r>
           </a:p>
           <a:p>
             <a:pPr lvl="2"/>
             <a:r>
-              <a:rPr lang="en-US" smtClean="0"/>
+              <a:rPr lang="en-US"/>
               <a:t>Third level</a:t>
             </a:r>
           </a:p>
           <a:p>
             <a:pPr lvl="3"/>
             <a:r>
-              <a:rPr lang="en-US" smtClean="0"/>
+              <a:rPr lang="en-US"/>
               <a:t>Fourth level</a:t>
             </a:r>
           </a:p>
           <a:p>
             <a:pPr lvl="4"/>
             <a:r>
-              <a:rPr lang="en-US" smtClean="0"/>
+              <a:rPr lang="en-US"/>
               <a:t>Fifth level</a:t>
             </a:r>
-            <a:endParaRPr lang="en-US"/>
           </a:p>
         </p:txBody>
       </p:sp>
@@ -827,7 +826,7 @@
           <a:p>
             <a:fld id="{78C97017-6FC3-485B-9764-EAC9E56C1D49}" type="datetimeFigureOut">
               <a:rPr lang="en-US" smtClean="0"/>
-              <a:t>9/4/17</a:t>
+              <a:t>11/13/2017</a:t>
             </a:fld>
             <a:endParaRPr lang="en-US"/>
           </a:p>
@@ -926,10 +925,9 @@
           <a:lstStyle/>
           <a:p>
             <a:r>
-              <a:rPr lang="en-US" smtClean="0"/>
+              <a:rPr lang="en-US"/>
               <a:t>Click to edit Master title style</a:t>
             </a:r>
-            <a:endParaRPr lang="en-US"/>
           </a:p>
         </p:txBody>
       </p:sp>
@@ -955,38 +953,37 @@
           <a:p>
             <a:pPr lvl="0"/>
             <a:r>
-              <a:rPr lang="en-US" smtClean="0"/>
+              <a:rPr lang="en-US"/>
               <a:t>Click to edit Master text styles</a:t>
             </a:r>
           </a:p>
           <a:p>
             <a:pPr lvl="1"/>
             <a:r>
-              <a:rPr lang="en-US" smtClean="0"/>
+              <a:rPr lang="en-US"/>
               <a:t>Second level</a:t>
             </a:r>
           </a:p>
           <a:p>
             <a:pPr lvl="2"/>
             <a:r>
-              <a:rPr lang="en-US" smtClean="0"/>
+              <a:rPr lang="en-US"/>
               <a:t>Third level</a:t>
             </a:r>
           </a:p>
           <a:p>
             <a:pPr lvl="3"/>
             <a:r>
-              <a:rPr lang="en-US" smtClean="0"/>
+              <a:rPr lang="en-US"/>
               <a:t>Fourth level</a:t>
             </a:r>
           </a:p>
           <a:p>
             <a:pPr lvl="4"/>
             <a:r>
-              <a:rPr lang="en-US" smtClean="0"/>
+              <a:rPr lang="en-US"/>
               <a:t>Fifth level</a:t>
             </a:r>
-            <a:endParaRPr lang="en-US"/>
           </a:p>
         </p:txBody>
       </p:sp>
@@ -1007,7 +1004,7 @@
           <a:p>
             <a:fld id="{78C97017-6FC3-485B-9764-EAC9E56C1D49}" type="datetimeFigureOut">
               <a:rPr lang="en-US" smtClean="0"/>
-              <a:t>9/4/17</a:t>
+              <a:t>11/13/2017</a:t>
             </a:fld>
             <a:endParaRPr lang="en-US"/>
           </a:p>
@@ -1101,10 +1098,9 @@
           <a:lstStyle/>
           <a:p>
             <a:r>
-              <a:rPr lang="en-US" smtClean="0"/>
+              <a:rPr lang="en-US"/>
               <a:t>Click to edit Master title style</a:t>
             </a:r>
-            <a:endParaRPr lang="en-US"/>
           </a:p>
         </p:txBody>
       </p:sp>
@@ -1125,38 +1121,37 @@
           <a:p>
             <a:pPr lvl="0"/>
             <a:r>
-              <a:rPr lang="en-US" smtClean="0"/>
+              <a:rPr lang="en-US"/>
               <a:t>Click to edit Master text styles</a:t>
             </a:r>
           </a:p>
           <a:p>
             <a:pPr lvl="1"/>
             <a:r>
-              <a:rPr lang="en-US" smtClean="0"/>
+              <a:rPr lang="en-US"/>
               <a:t>Second level</a:t>
             </a:r>
           </a:p>
           <a:p>
             <a:pPr lvl="2"/>
             <a:r>
-              <a:rPr lang="en-US" smtClean="0"/>
+              <a:rPr lang="en-US"/>
               <a:t>Third level</a:t>
             </a:r>
           </a:p>
           <a:p>
             <a:pPr lvl="3"/>
             <a:r>
-              <a:rPr lang="en-US" smtClean="0"/>
+              <a:rPr lang="en-US"/>
               <a:t>Fourth level</a:t>
             </a:r>
           </a:p>
           <a:p>
             <a:pPr lvl="4"/>
             <a:r>
-              <a:rPr lang="en-US" smtClean="0"/>
+              <a:rPr lang="en-US"/>
               <a:t>Fifth level</a:t>
             </a:r>
-            <a:endParaRPr lang="en-US"/>
           </a:p>
         </p:txBody>
       </p:sp>
@@ -1177,7 +1172,7 @@
           <a:p>
             <a:fld id="{78C97017-6FC3-485B-9764-EAC9E56C1D49}" type="datetimeFigureOut">
               <a:rPr lang="en-US" smtClean="0"/>
-              <a:t>9/4/17</a:t>
+              <a:t>11/13/2017</a:t>
             </a:fld>
             <a:endParaRPr lang="en-US"/>
           </a:p>
@@ -1280,10 +1275,9 @@
           </a:lstStyle>
           <a:p>
             <a:r>
-              <a:rPr lang="en-US" smtClean="0"/>
+              <a:rPr lang="en-US"/>
               <a:t>Click to edit Master title style</a:t>
             </a:r>
-            <a:endParaRPr lang="en-US"/>
           </a:p>
         </p:txBody>
       </p:sp>
@@ -1400,7 +1394,7 @@
           <a:p>
             <a:pPr lvl="0"/>
             <a:r>
-              <a:rPr lang="en-US" smtClean="0"/>
+              <a:rPr lang="en-US"/>
               <a:t>Click to edit Master text styles</a:t>
             </a:r>
           </a:p>
@@ -1423,7 +1417,7 @@
           <a:p>
             <a:fld id="{78C97017-6FC3-485B-9764-EAC9E56C1D49}" type="datetimeFigureOut">
               <a:rPr lang="en-US" smtClean="0"/>
-              <a:t>9/4/17</a:t>
+              <a:t>11/13/2017</a:t>
             </a:fld>
             <a:endParaRPr lang="en-US"/>
           </a:p>
@@ -1517,10 +1511,9 @@
           <a:lstStyle/>
           <a:p>
             <a:r>
-              <a:rPr lang="en-US" smtClean="0"/>
+              <a:rPr lang="en-US"/>
               <a:t>Click to edit Master title style</a:t>
             </a:r>
-            <a:endParaRPr lang="en-US"/>
           </a:p>
         </p:txBody>
       </p:sp>
@@ -1574,38 +1567,37 @@
           <a:p>
             <a:pPr lvl="0"/>
             <a:r>
-              <a:rPr lang="en-US" smtClean="0"/>
+              <a:rPr lang="en-US"/>
               <a:t>Click to edit Master text styles</a:t>
             </a:r>
           </a:p>
           <a:p>
             <a:pPr lvl="1"/>
             <a:r>
-              <a:rPr lang="en-US" smtClean="0"/>
+              <a:rPr lang="en-US"/>
               <a:t>Second level</a:t>
             </a:r>
           </a:p>
           <a:p>
             <a:pPr lvl="2"/>
             <a:r>
-              <a:rPr lang="en-US" smtClean="0"/>
+              <a:rPr lang="en-US"/>
               <a:t>Third level</a:t>
             </a:r>
           </a:p>
           <a:p>
             <a:pPr lvl="3"/>
             <a:r>
-              <a:rPr lang="en-US" smtClean="0"/>
+              <a:rPr lang="en-US"/>
               <a:t>Fourth level</a:t>
             </a:r>
           </a:p>
           <a:p>
             <a:pPr lvl="4"/>
             <a:r>
-              <a:rPr lang="en-US" smtClean="0"/>
+              <a:rPr lang="en-US"/>
               <a:t>Fifth level</a:t>
             </a:r>
-            <a:endParaRPr lang="en-US"/>
           </a:p>
         </p:txBody>
       </p:sp>
@@ -1659,38 +1651,37 @@
           <a:p>
             <a:pPr lvl="0"/>
             <a:r>
-              <a:rPr lang="en-US" smtClean="0"/>
+              <a:rPr lang="en-US"/>
               <a:t>Click to edit Master text styles</a:t>
             </a:r>
           </a:p>
           <a:p>
             <a:pPr lvl="1"/>
             <a:r>
-              <a:rPr lang="en-US" smtClean="0"/>
+              <a:rPr lang="en-US"/>
               <a:t>Second level</a:t>
             </a:r>
           </a:p>
           <a:p>
             <a:pPr lvl="2"/>
             <a:r>
-              <a:rPr lang="en-US" smtClean="0"/>
+              <a:rPr lang="en-US"/>
               <a:t>Third level</a:t>
             </a:r>
           </a:p>
           <a:p>
             <a:pPr lvl="3"/>
             <a:r>
-              <a:rPr lang="en-US" smtClean="0"/>
+              <a:rPr lang="en-US"/>
               <a:t>Fourth level</a:t>
             </a:r>
           </a:p>
           <a:p>
             <a:pPr lvl="4"/>
             <a:r>
-              <a:rPr lang="en-US" smtClean="0"/>
+              <a:rPr lang="en-US"/>
               <a:t>Fifth level</a:t>
             </a:r>
-            <a:endParaRPr lang="en-US"/>
           </a:p>
         </p:txBody>
       </p:sp>
@@ -1711,7 +1702,7 @@
           <a:p>
             <a:fld id="{78C97017-6FC3-485B-9764-EAC9E56C1D49}" type="datetimeFigureOut">
               <a:rPr lang="en-US" smtClean="0"/>
-              <a:t>9/4/17</a:t>
+              <a:t>11/13/2017</a:t>
             </a:fld>
             <a:endParaRPr lang="en-US"/>
           </a:p>
@@ -1809,10 +1800,9 @@
           </a:lstStyle>
           <a:p>
             <a:r>
-              <a:rPr lang="en-US" smtClean="0"/>
+              <a:rPr lang="en-US"/>
               <a:t>Click to edit Master title style</a:t>
             </a:r>
-            <a:endParaRPr lang="en-US"/>
           </a:p>
         </p:txBody>
       </p:sp>
@@ -1875,7 +1865,7 @@
           <a:p>
             <a:pPr lvl="0"/>
             <a:r>
-              <a:rPr lang="en-US" smtClean="0"/>
+              <a:rPr lang="en-US"/>
               <a:t>Click to edit Master text styles</a:t>
             </a:r>
           </a:p>
@@ -1931,38 +1921,37 @@
           <a:p>
             <a:pPr lvl="0"/>
             <a:r>
-              <a:rPr lang="en-US" smtClean="0"/>
+              <a:rPr lang="en-US"/>
               <a:t>Click to edit Master text styles</a:t>
             </a:r>
           </a:p>
           <a:p>
             <a:pPr lvl="1"/>
             <a:r>
-              <a:rPr lang="en-US" smtClean="0"/>
+              <a:rPr lang="en-US"/>
               <a:t>Second level</a:t>
             </a:r>
           </a:p>
           <a:p>
             <a:pPr lvl="2"/>
             <a:r>
-              <a:rPr lang="en-US" smtClean="0"/>
+              <a:rPr lang="en-US"/>
               <a:t>Third level</a:t>
             </a:r>
           </a:p>
           <a:p>
             <a:pPr lvl="3"/>
             <a:r>
-              <a:rPr lang="en-US" smtClean="0"/>
+              <a:rPr lang="en-US"/>
               <a:t>Fourth level</a:t>
             </a:r>
           </a:p>
           <a:p>
             <a:pPr lvl="4"/>
             <a:r>
-              <a:rPr lang="en-US" smtClean="0"/>
+              <a:rPr lang="en-US"/>
               <a:t>Fifth level</a:t>
             </a:r>
-            <a:endParaRPr lang="en-US"/>
           </a:p>
         </p:txBody>
       </p:sp>
@@ -2025,7 +2014,7 @@
           <a:p>
             <a:pPr lvl="0"/>
             <a:r>
-              <a:rPr lang="en-US" smtClean="0"/>
+              <a:rPr lang="en-US"/>
               <a:t>Click to edit Master text styles</a:t>
             </a:r>
           </a:p>
@@ -2081,38 +2070,37 @@
           <a:p>
             <a:pPr lvl="0"/>
             <a:r>
-              <a:rPr lang="en-US" smtClean="0"/>
+              <a:rPr lang="en-US"/>
               <a:t>Click to edit Master text styles</a:t>
             </a:r>
           </a:p>
           <a:p>
             <a:pPr lvl="1"/>
             <a:r>
-              <a:rPr lang="en-US" smtClean="0"/>
+              <a:rPr lang="en-US"/>
               <a:t>Second level</a:t>
             </a:r>
           </a:p>
           <a:p>
             <a:pPr lvl="2"/>
             <a:r>
-              <a:rPr lang="en-US" smtClean="0"/>
+              <a:rPr lang="en-US"/>
               <a:t>Third level</a:t>
             </a:r>
           </a:p>
           <a:p>
             <a:pPr lvl="3"/>
             <a:r>
-              <a:rPr lang="en-US" smtClean="0"/>
+              <a:rPr lang="en-US"/>
               <a:t>Fourth level</a:t>
             </a:r>
           </a:p>
           <a:p>
             <a:pPr lvl="4"/>
             <a:r>
-              <a:rPr lang="en-US" smtClean="0"/>
+              <a:rPr lang="en-US"/>
               <a:t>Fifth level</a:t>
             </a:r>
-            <a:endParaRPr lang="en-US"/>
           </a:p>
         </p:txBody>
       </p:sp>
@@ -2133,7 +2121,7 @@
           <a:p>
             <a:fld id="{78C97017-6FC3-485B-9764-EAC9E56C1D49}" type="datetimeFigureOut">
               <a:rPr lang="en-US" smtClean="0"/>
-              <a:t>9/4/17</a:t>
+              <a:t>11/13/2017</a:t>
             </a:fld>
             <a:endParaRPr lang="en-US"/>
           </a:p>
@@ -2227,10 +2215,9 @@
           <a:lstStyle/>
           <a:p>
             <a:r>
-              <a:rPr lang="en-US" smtClean="0"/>
+              <a:rPr lang="en-US"/>
               <a:t>Click to edit Master title style</a:t>
             </a:r>
-            <a:endParaRPr lang="en-US"/>
           </a:p>
         </p:txBody>
       </p:sp>
@@ -2251,7 +2238,7 @@
           <a:p>
             <a:fld id="{78C97017-6FC3-485B-9764-EAC9E56C1D49}" type="datetimeFigureOut">
               <a:rPr lang="en-US" smtClean="0"/>
-              <a:t>9/4/17</a:t>
+              <a:t>11/13/2017</a:t>
             </a:fld>
             <a:endParaRPr lang="en-US"/>
           </a:p>
@@ -2346,7 +2333,7 @@
           <a:p>
             <a:fld id="{78C97017-6FC3-485B-9764-EAC9E56C1D49}" type="datetimeFigureOut">
               <a:rPr lang="en-US" smtClean="0"/>
-              <a:t>9/4/17</a:t>
+              <a:t>11/13/2017</a:t>
             </a:fld>
             <a:endParaRPr lang="en-US"/>
           </a:p>
@@ -2449,10 +2436,9 @@
           </a:lstStyle>
           <a:p>
             <a:r>
-              <a:rPr lang="en-US" smtClean="0"/>
+              <a:rPr lang="en-US"/>
               <a:t>Click to edit Master title style</a:t>
             </a:r>
-            <a:endParaRPr lang="en-US"/>
           </a:p>
         </p:txBody>
       </p:sp>
@@ -2506,38 +2492,37 @@
           <a:p>
             <a:pPr lvl="0"/>
             <a:r>
-              <a:rPr lang="en-US" smtClean="0"/>
+              <a:rPr lang="en-US"/>
               <a:t>Click to edit Master text styles</a:t>
             </a:r>
           </a:p>
           <a:p>
             <a:pPr lvl="1"/>
             <a:r>
-              <a:rPr lang="en-US" smtClean="0"/>
+              <a:rPr lang="en-US"/>
               <a:t>Second level</a:t>
             </a:r>
           </a:p>
           <a:p>
             <a:pPr lvl="2"/>
             <a:r>
-              <a:rPr lang="en-US" smtClean="0"/>
+              <a:rPr lang="en-US"/>
               <a:t>Third level</a:t>
             </a:r>
           </a:p>
           <a:p>
             <a:pPr lvl="3"/>
             <a:r>
-              <a:rPr lang="en-US" smtClean="0"/>
+              <a:rPr lang="en-US"/>
               <a:t>Fourth level</a:t>
             </a:r>
           </a:p>
           <a:p>
             <a:pPr lvl="4"/>
             <a:r>
-              <a:rPr lang="en-US" smtClean="0"/>
+              <a:rPr lang="en-US"/>
               <a:t>Fifth level</a:t>
             </a:r>
-            <a:endParaRPr lang="en-US"/>
           </a:p>
         </p:txBody>
       </p:sp>
@@ -2600,7 +2585,7 @@
           <a:p>
             <a:pPr lvl="0"/>
             <a:r>
-              <a:rPr lang="en-US" smtClean="0"/>
+              <a:rPr lang="en-US"/>
               <a:t>Click to edit Master text styles</a:t>
             </a:r>
           </a:p>
@@ -2623,7 +2608,7 @@
           <a:p>
             <a:fld id="{78C97017-6FC3-485B-9764-EAC9E56C1D49}" type="datetimeFigureOut">
               <a:rPr lang="en-US" smtClean="0"/>
-              <a:t>9/4/17</a:t>
+              <a:t>11/13/2017</a:t>
             </a:fld>
             <a:endParaRPr lang="en-US"/>
           </a:p>
@@ -2726,10 +2711,9 @@
           </a:lstStyle>
           <a:p>
             <a:r>
-              <a:rPr lang="en-US" smtClean="0"/>
+              <a:rPr lang="en-US"/>
               <a:t>Click to edit Master title style</a:t>
             </a:r>
-            <a:endParaRPr lang="en-US"/>
           </a:p>
         </p:txBody>
       </p:sp>
@@ -2853,7 +2837,7 @@
           <a:p>
             <a:pPr lvl="0"/>
             <a:r>
-              <a:rPr lang="en-US" smtClean="0"/>
+              <a:rPr lang="en-US"/>
               <a:t>Click to edit Master text styles</a:t>
             </a:r>
           </a:p>
@@ -2876,7 +2860,7 @@
           <a:p>
             <a:fld id="{78C97017-6FC3-485B-9764-EAC9E56C1D49}" type="datetimeFigureOut">
               <a:rPr lang="en-US" smtClean="0"/>
-              <a:t>9/4/17</a:t>
+              <a:t>11/13/2017</a:t>
             </a:fld>
             <a:endParaRPr lang="en-US"/>
           </a:p>
@@ -2985,10 +2969,9 @@
           <a:lstStyle/>
           <a:p>
             <a:r>
-              <a:rPr lang="en-US" smtClean="0"/>
+              <a:rPr lang="en-US"/>
               <a:t>Click to edit Master title style</a:t>
             </a:r>
-            <a:endParaRPr lang="en-US"/>
           </a:p>
         </p:txBody>
       </p:sp>
@@ -3019,38 +3002,37 @@
           <a:p>
             <a:pPr lvl="0"/>
             <a:r>
-              <a:rPr lang="en-US" smtClean="0"/>
+              <a:rPr lang="en-US"/>
               <a:t>Click to edit Master text styles</a:t>
             </a:r>
           </a:p>
           <a:p>
             <a:pPr lvl="1"/>
             <a:r>
-              <a:rPr lang="en-US" smtClean="0"/>
+              <a:rPr lang="en-US"/>
               <a:t>Second level</a:t>
             </a:r>
           </a:p>
           <a:p>
             <a:pPr lvl="2"/>
             <a:r>
-              <a:rPr lang="en-US" smtClean="0"/>
+              <a:rPr lang="en-US"/>
               <a:t>Third level</a:t>
             </a:r>
           </a:p>
           <a:p>
             <a:pPr lvl="3"/>
             <a:r>
-              <a:rPr lang="en-US" smtClean="0"/>
+              <a:rPr lang="en-US"/>
               <a:t>Fourth level</a:t>
             </a:r>
           </a:p>
           <a:p>
             <a:pPr lvl="4"/>
             <a:r>
-              <a:rPr lang="en-US" smtClean="0"/>
+              <a:rPr lang="en-US"/>
               <a:t>Fifth level</a:t>
             </a:r>
-            <a:endParaRPr lang="en-US"/>
           </a:p>
         </p:txBody>
       </p:sp>
@@ -3089,7 +3071,7 @@
           <a:p>
             <a:fld id="{78C97017-6FC3-485B-9764-EAC9E56C1D49}" type="datetimeFigureOut">
               <a:rPr lang="en-US" smtClean="0"/>
-              <a:t>9/4/17</a:t>
+              <a:t>11/13/2017</a:t>
             </a:fld>
             <a:endParaRPr lang="en-US"/>
           </a:p>
@@ -3473,7 +3455,7 @@
         <p:spPr>
           <a:xfrm>
             <a:off x="1119865" y="1727200"/>
-            <a:ext cx="7490735" cy="2997200"/>
+            <a:ext cx="7643135" cy="2997200"/>
           </a:xfrm>
           <a:prstGeom prst="roundRect">
             <a:avLst>
@@ -3510,7 +3492,7 @@
           <a:lstStyle/>
           <a:p>
             <a:r>
-              <a:rPr lang="en-US" sz="1200" b="1" dirty="0" smtClean="0">
+              <a:rPr lang="en-US" sz="1200" b="1" dirty="0">
                 <a:solidFill>
                   <a:srgbClr val="7030A0"/>
                 </a:solidFill>
@@ -3569,7 +3551,7 @@
           <a:p>
             <a:pPr algn="ctr"/>
             <a:r>
-              <a:rPr lang="en-US" sz="1050" dirty="0" err="1" smtClean="0">
+              <a:rPr lang="en-US" sz="1050" dirty="0" err="1">
                 <a:solidFill>
                   <a:schemeClr val="bg1"/>
                 </a:solidFill>
@@ -3628,7 +3610,7 @@
           <a:p>
             <a:pPr algn="ctr"/>
             <a:r>
-              <a:rPr lang="en-US" sz="1050" dirty="0" err="1" smtClean="0">
+              <a:rPr lang="en-US" sz="1050" dirty="0" err="1">
                 <a:solidFill>
                   <a:schemeClr val="bg1"/>
                 </a:solidFill>
@@ -3783,7 +3765,7 @@
           <a:p>
             <a:pPr algn="ctr"/>
             <a:r>
-              <a:rPr lang="en-US" sz="1050" dirty="0" smtClean="0">
+              <a:rPr lang="en-US" sz="1050" dirty="0">
                 <a:solidFill>
                   <a:schemeClr val="bg1"/>
                 </a:solidFill>
@@ -4107,7 +4089,7 @@
           <a:p>
             <a:pPr algn="ctr"/>
             <a:r>
-              <a:rPr lang="en-US" sz="1050" dirty="0" err="1" smtClean="0">
+              <a:rPr lang="en-US" sz="1050" dirty="0" err="1">
                 <a:solidFill>
                   <a:srgbClr val="7030A0"/>
                 </a:solidFill>
@@ -4249,7 +4231,7 @@
           <a:p>
             <a:pPr algn="ctr"/>
             <a:r>
-              <a:rPr lang="en-US" sz="1050" dirty="0" err="1" smtClean="0">
+              <a:rPr lang="en-US" sz="1050" dirty="0" err="1">
                 <a:solidFill>
                   <a:srgbClr val="7030A0"/>
                 </a:solidFill>
@@ -4393,7 +4375,7 @@
           <a:p>
             <a:pPr algn="ctr"/>
             <a:r>
-              <a:rPr lang="en-US" sz="1050" dirty="0" err="1" smtClean="0">
+              <a:rPr lang="en-US" sz="1050" dirty="0" err="1">
                 <a:solidFill>
                   <a:srgbClr val="7030A0"/>
                 </a:solidFill>
@@ -4492,7 +4474,7 @@
           <a:p>
             <a:pPr algn="ctr"/>
             <a:r>
-              <a:rPr lang="en-US" sz="1050" dirty="0" smtClean="0">
+              <a:rPr lang="en-US" sz="1050" dirty="0">
                 <a:solidFill>
                   <a:srgbClr val="7030A0"/>
                 </a:solidFill>
@@ -4634,7 +4616,7 @@
           <a:p>
             <a:pPr algn="ctr"/>
             <a:r>
-              <a:rPr lang="en-US" sz="1050" dirty="0" smtClean="0">
+              <a:rPr lang="en-US" sz="1050" dirty="0">
                 <a:solidFill>
                   <a:srgbClr val="7030A0"/>
                 </a:solidFill>
@@ -4776,7 +4758,7 @@
           <a:p>
             <a:pPr algn="ctr"/>
             <a:r>
-              <a:rPr lang="en-US" sz="1050" dirty="0" smtClean="0">
+              <a:rPr lang="en-US" sz="1050" dirty="0">
                 <a:solidFill>
                   <a:srgbClr val="7030A0"/>
                 </a:solidFill>
@@ -4784,14 +4766,14 @@
               <a:t>&lt;&lt;interface&gt;&gt;</a:t>
             </a:r>
             <a:br>
-              <a:rPr lang="en-US" sz="1050" dirty="0" smtClean="0">
+              <a:rPr lang="en-US" sz="1050" dirty="0">
                 <a:solidFill>
                   <a:srgbClr val="7030A0"/>
                 </a:solidFill>
               </a:rPr>
             </a:br>
             <a:r>
-              <a:rPr lang="en-US" sz="1050" dirty="0" err="1" smtClean="0">
+              <a:rPr lang="en-US" sz="1050" dirty="0" err="1">
                 <a:solidFill>
                   <a:srgbClr val="7030A0"/>
                 </a:solidFill>
@@ -4814,7 +4796,7 @@
         </p:nvSpPr>
         <p:spPr>
           <a:xfrm>
-            <a:off x="7712397" y="2564238"/>
+            <a:off x="7738821" y="2137677"/>
             <a:ext cx="708186" cy="285783"/>
           </a:xfrm>
           <a:prstGeom prst="rect">
@@ -4847,7 +4829,7 @@
           <a:p>
             <a:pPr algn="ctr"/>
             <a:r>
-              <a:rPr lang="en-US" sz="1050" dirty="0" smtClean="0">
+              <a:rPr lang="en-US" sz="1050" dirty="0">
                 <a:solidFill>
                   <a:srgbClr val="7030A0"/>
                 </a:solidFill>
@@ -4920,8 +4902,8 @@
         </p:nvCxnSpPr>
         <p:spPr>
           <a:xfrm flipV="1">
-            <a:off x="7277995" y="2707130"/>
-            <a:ext cx="434402" cy="327761"/>
+            <a:off x="7277995" y="2280569"/>
+            <a:ext cx="460826" cy="754322"/>
           </a:xfrm>
           <a:prstGeom prst="bentConnector3">
             <a:avLst/>
@@ -4958,7 +4940,7 @@
         </p:nvSpPr>
         <p:spPr>
           <a:xfrm>
-            <a:off x="7712397" y="2887216"/>
+            <a:off x="7738821" y="2460655"/>
             <a:ext cx="708186" cy="285783"/>
           </a:xfrm>
           <a:prstGeom prst="rect">
@@ -4991,7 +4973,7 @@
           <a:p>
             <a:pPr algn="ctr"/>
             <a:r>
-              <a:rPr lang="en-US" sz="1050" dirty="0" smtClean="0">
+              <a:rPr lang="en-US" sz="1050" dirty="0">
                 <a:solidFill>
                   <a:srgbClr val="7030A0"/>
                 </a:solidFill>
@@ -5017,8 +4999,8 @@
         </p:nvCxnSpPr>
         <p:spPr>
           <a:xfrm flipV="1">
-            <a:off x="7277995" y="3030108"/>
-            <a:ext cx="434402" cy="4783"/>
+            <a:off x="7277995" y="2603547"/>
+            <a:ext cx="460826" cy="431344"/>
           </a:xfrm>
           <a:prstGeom prst="bentConnector3">
             <a:avLst/>
@@ -5055,7 +5037,7 @@
         </p:nvSpPr>
         <p:spPr>
           <a:xfrm>
-            <a:off x="7712397" y="3210194"/>
+            <a:off x="7738821" y="2783633"/>
             <a:ext cx="708186" cy="285783"/>
           </a:xfrm>
           <a:prstGeom prst="rect">
@@ -5088,7 +5070,7 @@
           <a:p>
             <a:pPr algn="ctr"/>
             <a:r>
-              <a:rPr lang="en-US" sz="1050" dirty="0" smtClean="0">
+              <a:rPr lang="en-US" sz="1050" dirty="0">
                 <a:solidFill>
                   <a:srgbClr val="7030A0"/>
                 </a:solidFill>
@@ -5113,9 +5095,9 @@
           <p:nvPr/>
         </p:nvCxnSpPr>
         <p:spPr>
-          <a:xfrm>
-            <a:off x="7277995" y="3034891"/>
-            <a:ext cx="434402" cy="318195"/>
+          <a:xfrm flipV="1">
+            <a:off x="7277995" y="2926525"/>
+            <a:ext cx="460826" cy="108366"/>
           </a:xfrm>
           <a:prstGeom prst="bentConnector3">
             <a:avLst/>
@@ -5152,7 +5134,7 @@
         </p:nvSpPr>
         <p:spPr>
           <a:xfrm>
-            <a:off x="7712397" y="3533171"/>
+            <a:off x="7738821" y="3106610"/>
             <a:ext cx="708186" cy="285783"/>
           </a:xfrm>
           <a:prstGeom prst="rect">
@@ -5185,7 +5167,7 @@
           <a:p>
             <a:pPr algn="ctr"/>
             <a:r>
-              <a:rPr lang="en-US" sz="1050" dirty="0" smtClean="0">
+              <a:rPr lang="en-US" sz="1050" dirty="0">
                 <a:solidFill>
                   <a:srgbClr val="7030A0"/>
                 </a:solidFill>
@@ -5212,7 +5194,7 @@
         <p:spPr>
           <a:xfrm>
             <a:off x="7277995" y="3034891"/>
-            <a:ext cx="434402" cy="641172"/>
+            <a:ext cx="460826" cy="214611"/>
           </a:xfrm>
           <a:prstGeom prst="bentConnector3">
             <a:avLst/>
@@ -5373,7 +5355,7 @@
           <a:p>
             <a:pPr algn="ctr"/>
             <a:r>
-              <a:rPr lang="en-US" sz="1050" dirty="0" smtClean="0">
+              <a:rPr lang="en-US" sz="1050" dirty="0">
                 <a:solidFill>
                   <a:srgbClr val="7030A0"/>
                 </a:solidFill>
@@ -5381,14 +5363,14 @@
               <a:t>&lt;&lt;interface&gt;&gt;</a:t>
             </a:r>
             <a:br>
-              <a:rPr lang="en-US" sz="1050" dirty="0" smtClean="0">
+              <a:rPr lang="en-US" sz="1050" dirty="0">
                 <a:solidFill>
                   <a:srgbClr val="7030A0"/>
                 </a:solidFill>
               </a:rPr>
             </a:br>
             <a:r>
-              <a:rPr lang="en-US" sz="1050" dirty="0" err="1" smtClean="0">
+              <a:rPr lang="en-US" sz="1050" dirty="0" err="1">
                 <a:solidFill>
                   <a:srgbClr val="7030A0"/>
                 </a:solidFill>
@@ -5427,7 +5409,7 @@
           <a:p>
             <a:pPr algn="r"/>
             <a:r>
-              <a:rPr lang="en-US" sz="1100" dirty="0" smtClean="0">
+              <a:rPr lang="en-US" sz="1100" dirty="0">
                 <a:solidFill>
                   <a:srgbClr val="7030A0"/>
                 </a:solidFill>
@@ -5483,20 +5465,12 @@
           <a:p>
             <a:pPr algn="ctr"/>
             <a:r>
-              <a:rPr lang="en-US" sz="1050" dirty="0" smtClean="0">
+              <a:rPr lang="en-US" sz="1050" dirty="0">
                 <a:solidFill>
                   <a:srgbClr val="7030A0"/>
                 </a:solidFill>
               </a:rPr>
               <a:t>&lt;&lt;interface&gt;&gt;</a:t>
-            </a:r>
-            <a:r>
-              <a:rPr lang="en-US" sz="1050">
-                <a:solidFill>
-                  <a:srgbClr val="7030A0"/>
-                </a:solidFill>
-              </a:rPr>
-              <a:t/>
             </a:r>
             <a:br>
               <a:rPr lang="en-US" sz="1050">
@@ -5506,7 +5480,7 @@
               </a:rPr>
             </a:br>
             <a:r>
-              <a:rPr lang="en-US" sz="1050" dirty="0" err="1" smtClean="0">
+              <a:rPr lang="en-US" sz="1050" dirty="0" err="1">
                 <a:solidFill>
                   <a:srgbClr val="7030A0"/>
                 </a:solidFill>
@@ -5628,7 +5602,7 @@
           <a:p>
             <a:pPr algn="ctr"/>
             <a:r>
-              <a:rPr lang="en-US" sz="1100" dirty="0" smtClean="0">
+              <a:rPr lang="en-US" sz="1100" dirty="0">
                 <a:solidFill>
                   <a:srgbClr val="7030A0"/>
                 </a:solidFill>
@@ -5667,7 +5641,7 @@
           <a:p>
             <a:pPr algn="ctr"/>
             <a:r>
-              <a:rPr lang="en-US" sz="1100" dirty="0" smtClean="0">
+              <a:rPr lang="en-US" sz="1100" dirty="0">
                 <a:solidFill>
                   <a:srgbClr val="7030A0"/>
                 </a:solidFill>
@@ -5706,7 +5680,7 @@
           <a:p>
             <a:pPr algn="ctr"/>
             <a:r>
-              <a:rPr lang="en-US" sz="1100" dirty="0" smtClean="0">
+              <a:rPr lang="en-US" sz="1100" dirty="0">
                 <a:solidFill>
                   <a:srgbClr val="7030A0"/>
                 </a:solidFill>
@@ -5745,7 +5719,7 @@
           <a:p>
             <a:pPr algn="ctr"/>
             <a:r>
-              <a:rPr lang="en-US" sz="1100" dirty="0" smtClean="0">
+              <a:rPr lang="en-US" sz="1100" dirty="0">
                 <a:solidFill>
                   <a:srgbClr val="7030A0"/>
                 </a:solidFill>
@@ -5784,7 +5758,7 @@
           <a:p>
             <a:pPr algn="ctr"/>
             <a:r>
-              <a:rPr lang="en-US" sz="1100" dirty="0" smtClean="0">
+              <a:rPr lang="en-US" sz="1100" dirty="0">
                 <a:solidFill>
                   <a:srgbClr val="7030A0"/>
                 </a:solidFill>
@@ -5823,7 +5797,7 @@
           <a:p>
             <a:pPr algn="ctr"/>
             <a:r>
-              <a:rPr lang="en-US" sz="1100" dirty="0" smtClean="0">
+              <a:rPr lang="en-US" sz="1100" dirty="0">
                 <a:solidFill>
                   <a:srgbClr val="7030A0"/>
                 </a:solidFill>
@@ -5862,7 +5836,7 @@
           <a:p>
             <a:pPr algn="ctr"/>
             <a:r>
-              <a:rPr lang="en-US" sz="1100" dirty="0" smtClean="0">
+              <a:rPr lang="en-US" sz="1100" dirty="0">
                 <a:solidFill>
                   <a:srgbClr val="7030A0"/>
                 </a:solidFill>
@@ -5901,7 +5875,7 @@
           <a:p>
             <a:pPr algn="ctr"/>
             <a:r>
-              <a:rPr lang="en-US" sz="1100" dirty="0" smtClean="0">
+              <a:rPr lang="en-US" sz="1100" dirty="0">
                 <a:solidFill>
                   <a:srgbClr val="7030A0"/>
                 </a:solidFill>
@@ -5916,6 +5890,331 @@
           </a:p>
         </p:txBody>
       </p:sp>
+      <p:sp>
+        <p:nvSpPr>
+          <p:cNvPr id="73" name="Rectangle 8">
+            <a:extLst>
+              <a:ext uri="{FF2B5EF4-FFF2-40B4-BE49-F238E27FC236}">
+                <a16:creationId xmlns:a16="http://schemas.microsoft.com/office/drawing/2014/main" id="{E7CF05FA-5C91-4A67-AB26-F279BDA4B0E7}"/>
+              </a:ext>
+            </a:extLst>
+          </p:cNvPr>
+          <p:cNvSpPr/>
+          <p:nvPr/>
+        </p:nvSpPr>
+        <p:spPr>
+          <a:xfrm>
+            <a:off x="7738821" y="3433173"/>
+            <a:ext cx="708186" cy="285783"/>
+          </a:xfrm>
+          <a:prstGeom prst="rect">
+            <a:avLst/>
+          </a:prstGeom>
+          <a:ln w="19050">
+            <a:solidFill>
+              <a:srgbClr val="7030A0"/>
+            </a:solidFill>
+          </a:ln>
+          <a:effectLst/>
+        </p:spPr>
+        <p:style>
+          <a:lnRef idx="1">
+            <a:schemeClr val="accent4"/>
+          </a:lnRef>
+          <a:fillRef idx="2">
+            <a:schemeClr val="accent4"/>
+          </a:fillRef>
+          <a:effectRef idx="1">
+            <a:schemeClr val="accent4"/>
+          </a:effectRef>
+          <a:fontRef idx="minor">
+            <a:schemeClr val="dk1"/>
+          </a:fontRef>
+        </p:style>
+        <p:txBody>
+          <a:bodyPr rtlCol="0" anchor="ctr"/>
+          <a:lstStyle/>
+          <a:p>
+            <a:pPr algn="ctr"/>
+            <a:r>
+              <a:rPr lang="en-US" sz="1050" dirty="0">
+                <a:solidFill>
+                  <a:srgbClr val="7030A0"/>
+                </a:solidFill>
+              </a:rPr>
+              <a:t>Remark</a:t>
+            </a:r>
+            <a:endParaRPr lang="en-SG" sz="1050" dirty="0">
+              <a:solidFill>
+                <a:srgbClr val="7030A0"/>
+              </a:solidFill>
+            </a:endParaRPr>
+          </a:p>
+        </p:txBody>
+      </p:sp>
+      <p:sp>
+        <p:nvSpPr>
+          <p:cNvPr id="74" name="Rectangle 8">
+            <a:extLst>
+              <a:ext uri="{FF2B5EF4-FFF2-40B4-BE49-F238E27FC236}">
+                <a16:creationId xmlns:a16="http://schemas.microsoft.com/office/drawing/2014/main" id="{D58B0C03-C500-4684-A426-9D504EA8AD57}"/>
+              </a:ext>
+            </a:extLst>
+          </p:cNvPr>
+          <p:cNvSpPr/>
+          <p:nvPr/>
+        </p:nvSpPr>
+        <p:spPr>
+          <a:xfrm>
+            <a:off x="7738820" y="3756593"/>
+            <a:ext cx="947979" cy="285783"/>
+          </a:xfrm>
+          <a:prstGeom prst="rect">
+            <a:avLst/>
+          </a:prstGeom>
+          <a:ln w="19050">
+            <a:solidFill>
+              <a:srgbClr val="7030A0"/>
+            </a:solidFill>
+          </a:ln>
+          <a:effectLst/>
+        </p:spPr>
+        <p:style>
+          <a:lnRef idx="1">
+            <a:schemeClr val="accent4"/>
+          </a:lnRef>
+          <a:fillRef idx="2">
+            <a:schemeClr val="accent4"/>
+          </a:fillRef>
+          <a:effectRef idx="1">
+            <a:schemeClr val="accent4"/>
+          </a:effectRef>
+          <a:fontRef idx="minor">
+            <a:schemeClr val="dk1"/>
+          </a:fontRef>
+        </p:style>
+        <p:txBody>
+          <a:bodyPr rtlCol="0" anchor="ctr"/>
+          <a:lstStyle/>
+          <a:p>
+            <a:pPr algn="ctr"/>
+            <a:r>
+              <a:rPr lang="en-US" sz="1050" dirty="0" err="1">
+                <a:solidFill>
+                  <a:srgbClr val="7030A0"/>
+                </a:solidFill>
+              </a:rPr>
+              <a:t>AccessCount</a:t>
+            </a:r>
+            <a:endParaRPr lang="en-SG" sz="1050" dirty="0">
+              <a:solidFill>
+                <a:srgbClr val="7030A0"/>
+              </a:solidFill>
+            </a:endParaRPr>
+          </a:p>
+        </p:txBody>
+      </p:sp>
+      <p:cxnSp>
+        <p:nvCxnSpPr>
+          <p:cNvPr id="77" name="Elbow Connector 85">
+            <a:extLst>
+              <a:ext uri="{FF2B5EF4-FFF2-40B4-BE49-F238E27FC236}">
+                <a16:creationId xmlns:a16="http://schemas.microsoft.com/office/drawing/2014/main" id="{240C3856-6F8C-4C31-87C9-6771BCA9D9D4}"/>
+              </a:ext>
+            </a:extLst>
+          </p:cNvPr>
+          <p:cNvCxnSpPr>
+            <a:cxnSpLocks/>
+            <a:endCxn id="73" idx="1"/>
+          </p:cNvCxnSpPr>
+          <p:nvPr/>
+        </p:nvCxnSpPr>
+        <p:spPr>
+          <a:xfrm rot="16200000" flipH="1">
+            <a:off x="7363865" y="3201109"/>
+            <a:ext cx="519498" cy="230413"/>
+          </a:xfrm>
+          <a:prstGeom prst="bentConnector2">
+            <a:avLst/>
+          </a:prstGeom>
+          <a:ln w="19050">
+            <a:solidFill>
+              <a:srgbClr val="7030A0"/>
+            </a:solidFill>
+            <a:headEnd type="none" w="med" len="med"/>
+            <a:tailEnd type="arrow" w="med" len="med"/>
+          </a:ln>
+          <a:effectLst/>
+        </p:spPr>
+        <p:style>
+          <a:lnRef idx="1">
+            <a:schemeClr val="accent2"/>
+          </a:lnRef>
+          <a:fillRef idx="2">
+            <a:schemeClr val="accent2"/>
+          </a:fillRef>
+          <a:effectRef idx="1">
+            <a:schemeClr val="accent2"/>
+          </a:effectRef>
+          <a:fontRef idx="minor">
+            <a:schemeClr val="dk1"/>
+          </a:fontRef>
+        </p:style>
+      </p:cxnSp>
+      <p:cxnSp>
+        <p:nvCxnSpPr>
+          <p:cNvPr id="82" name="Elbow Connector 85">
+            <a:extLst>
+              <a:ext uri="{FF2B5EF4-FFF2-40B4-BE49-F238E27FC236}">
+                <a16:creationId xmlns:a16="http://schemas.microsoft.com/office/drawing/2014/main" id="{C5AA5C2D-F466-4641-9BAC-61F2E6633ED8}"/>
+              </a:ext>
+            </a:extLst>
+          </p:cNvPr>
+          <p:cNvCxnSpPr>
+            <a:cxnSpLocks/>
+          </p:cNvCxnSpPr>
+          <p:nvPr/>
+        </p:nvCxnSpPr>
+        <p:spPr>
+          <a:xfrm rot="16200000" flipH="1">
+            <a:off x="7363866" y="3516785"/>
+            <a:ext cx="519498" cy="230413"/>
+          </a:xfrm>
+          <a:prstGeom prst="bentConnector2">
+            <a:avLst/>
+          </a:prstGeom>
+          <a:ln w="19050">
+            <a:solidFill>
+              <a:srgbClr val="7030A0"/>
+            </a:solidFill>
+            <a:headEnd type="none" w="med" len="med"/>
+            <a:tailEnd type="arrow" w="med" len="med"/>
+          </a:ln>
+          <a:effectLst/>
+        </p:spPr>
+        <p:style>
+          <a:lnRef idx="1">
+            <a:schemeClr val="accent2"/>
+          </a:lnRef>
+          <a:fillRef idx="2">
+            <a:schemeClr val="accent2"/>
+          </a:fillRef>
+          <a:effectRef idx="1">
+            <a:schemeClr val="accent2"/>
+          </a:effectRef>
+          <a:fontRef idx="minor">
+            <a:schemeClr val="dk1"/>
+          </a:fontRef>
+        </p:style>
+      </p:cxnSp>
+      <p:sp>
+        <p:nvSpPr>
+          <p:cNvPr id="87" name="Rectangle 8">
+            <a:extLst>
+              <a:ext uri="{FF2B5EF4-FFF2-40B4-BE49-F238E27FC236}">
+                <a16:creationId xmlns:a16="http://schemas.microsoft.com/office/drawing/2014/main" id="{812CAFFA-FE83-4014-B66E-C289D4B49F5E}"/>
+              </a:ext>
+            </a:extLst>
+          </p:cNvPr>
+          <p:cNvSpPr/>
+          <p:nvPr/>
+        </p:nvSpPr>
+        <p:spPr>
+          <a:xfrm>
+            <a:off x="7744442" y="4078786"/>
+            <a:ext cx="866158" cy="285783"/>
+          </a:xfrm>
+          <a:prstGeom prst="rect">
+            <a:avLst/>
+          </a:prstGeom>
+          <a:ln w="19050">
+            <a:solidFill>
+              <a:srgbClr val="7030A0"/>
+            </a:solidFill>
+          </a:ln>
+          <a:effectLst/>
+        </p:spPr>
+        <p:style>
+          <a:lnRef idx="1">
+            <a:schemeClr val="accent4"/>
+          </a:lnRef>
+          <a:fillRef idx="2">
+            <a:schemeClr val="accent4"/>
+          </a:fillRef>
+          <a:effectRef idx="1">
+            <a:schemeClr val="accent4"/>
+          </a:effectRef>
+          <a:fontRef idx="minor">
+            <a:schemeClr val="dk1"/>
+          </a:fontRef>
+        </p:style>
+        <p:txBody>
+          <a:bodyPr rtlCol="0" anchor="ctr"/>
+          <a:lstStyle/>
+          <a:p>
+            <a:pPr algn="ctr"/>
+            <a:r>
+              <a:rPr lang="en-US" sz="1050" dirty="0" err="1">
+                <a:solidFill>
+                  <a:srgbClr val="7030A0"/>
+                </a:solidFill>
+              </a:rPr>
+              <a:t>SocialMedia</a:t>
+            </a:r>
+            <a:endParaRPr lang="en-SG" sz="1050" dirty="0">
+              <a:solidFill>
+                <a:srgbClr val="7030A0"/>
+              </a:solidFill>
+            </a:endParaRPr>
+          </a:p>
+        </p:txBody>
+      </p:sp>
+      <p:cxnSp>
+        <p:nvCxnSpPr>
+          <p:cNvPr id="89" name="Elbow Connector 85">
+            <a:extLst>
+              <a:ext uri="{FF2B5EF4-FFF2-40B4-BE49-F238E27FC236}">
+                <a16:creationId xmlns:a16="http://schemas.microsoft.com/office/drawing/2014/main" id="{C891A1CE-2EF6-43C4-BE82-377C3C95E09F}"/>
+              </a:ext>
+            </a:extLst>
+          </p:cNvPr>
+          <p:cNvCxnSpPr>
+            <a:cxnSpLocks/>
+          </p:cNvCxnSpPr>
+          <p:nvPr/>
+        </p:nvCxnSpPr>
+        <p:spPr>
+          <a:xfrm rot="16200000" flipH="1">
+            <a:off x="7363865" y="3843348"/>
+            <a:ext cx="519498" cy="230413"/>
+          </a:xfrm>
+          <a:prstGeom prst="bentConnector2">
+            <a:avLst/>
+          </a:prstGeom>
+          <a:ln w="19050">
+            <a:solidFill>
+              <a:srgbClr val="7030A0"/>
+            </a:solidFill>
+            <a:headEnd type="none" w="med" len="med"/>
+            <a:tailEnd type="arrow" w="med" len="med"/>
+          </a:ln>
+          <a:effectLst/>
+        </p:spPr>
+        <p:style>
+          <a:lnRef idx="1">
+            <a:schemeClr val="accent2"/>
+          </a:lnRef>
+          <a:fillRef idx="2">
+            <a:schemeClr val="accent2"/>
+          </a:fillRef>
+          <a:effectRef idx="1">
+            <a:schemeClr val="accent2"/>
+          </a:effectRef>
+          <a:fontRef idx="minor">
+            <a:schemeClr val="dk1"/>
+          </a:fontRef>
+        </p:style>
+      </p:cxnSp>
     </p:spTree>
     <p:extLst>
       <p:ext uri="{BB962C8B-B14F-4D97-AF65-F5344CB8AC3E}">
@@ -5926,13 +6225,6 @@
   <p:clrMapOvr>
     <a:masterClrMapping/>
   </p:clrMapOvr>
-  <p:timing>
-    <p:tnLst>
-      <p:par>
-        <p:cTn id="1" dur="indefinite" restart="never" nodeType="tmRoot"/>
-      </p:par>
-    </p:tnLst>
-  </p:timing>
 </p:sld>
 </file>
 

</xml_diff>